<commit_message>
udpate README & slide
</commit_message>
<xml_diff>
--- a/slide/Phoenix LiveView - the best fit for startup & small company.pptx
+++ b/slide/Phoenix LiveView - the best fit for startup & small company.pptx
@@ -2038,7 +2038,7 @@
       </p:grpSpPr>
       <p:sp>
         <p:nvSpPr>
-          <p:cNvPr id="199" name="Google Shape;199;g303adc9a896_1_18:notes"/>
+          <p:cNvPr id="199" name="Google Shape;199;g31162aaa172_0_19:notes"/>
           <p:cNvSpPr/>
           <p:nvPr>
             <p:ph idx="2" type="sldImg"/>
@@ -2046,8 +2046,8 @@
         </p:nvSpPr>
         <p:spPr>
           <a:xfrm>
-            <a:off x="381300" y="685800"/>
-            <a:ext cx="6096000" cy="3429000"/>
+            <a:off x="381188" y="685800"/>
+            <a:ext cx="6096300" cy="3429000"/>
           </a:xfrm>
           <a:custGeom>
             <a:rect b="b" l="l" r="r" t="t"/>
@@ -2073,7 +2073,7 @@
       </p:sp>
       <p:sp>
         <p:nvSpPr>
-          <p:cNvPr id="200" name="Google Shape;200;g303adc9a896_1_18:notes"/>
+          <p:cNvPr id="200" name="Google Shape;200;g31162aaa172_0_19:notes"/>
           <p:cNvSpPr txBox="1"/>
           <p:nvPr>
             <p:ph idx="1" type="body"/>
@@ -2137,7 +2137,7 @@
       </p:grpSpPr>
       <p:sp>
         <p:nvSpPr>
-          <p:cNvPr id="206" name="Google Shape;206;g31162aaa172_0_19:notes"/>
+          <p:cNvPr id="206" name="Google Shape;206;g303adc9a896_1_18:notes"/>
           <p:cNvSpPr/>
           <p:nvPr>
             <p:ph idx="2" type="sldImg"/>
@@ -2145,8 +2145,8 @@
         </p:nvSpPr>
         <p:spPr>
           <a:xfrm>
-            <a:off x="381188" y="685800"/>
-            <a:ext cx="6096300" cy="3429000"/>
+            <a:off x="381300" y="685800"/>
+            <a:ext cx="6096000" cy="3429000"/>
           </a:xfrm>
           <a:custGeom>
             <a:rect b="b" l="l" r="r" t="t"/>
@@ -2172,7 +2172,7 @@
       </p:sp>
       <p:sp>
         <p:nvSpPr>
-          <p:cNvPr id="207" name="Google Shape;207;g31162aaa172_0_19:notes"/>
+          <p:cNvPr id="207" name="Google Shape;207;g303adc9a896_1_18:notes"/>
           <p:cNvSpPr txBox="1"/>
           <p:nvPr>
             <p:ph idx="1" type="body"/>
@@ -8920,7 +8920,7 @@
                   <a:schemeClr val="dk2"/>
                 </a:solidFill>
               </a:rPr>
-              <a:t>LiveView at server side will render full HTML for client for first time (a regular HTTP get request).</a:t>
+              <a:t>LiveView at server side will render full HTML (in case JS is disabled, friendly with search engine) for client for first time (a regular HTTP get request).</a:t>
             </a:r>
             <a:endParaRPr sz="1700">
               <a:solidFill>
@@ -8963,7 +8963,7 @@
                   <a:schemeClr val="dk2"/>
                 </a:solidFill>
               </a:rPr>
-              <a:t>After that server calculates diff HTML (for any event of client or server side) and send to client by Websocket. Client will update DOM after received diff HTML (using </a:t>
+              <a:t>After that server calculates diff HTML (for any event from client or internal server side) and send that to client (by websocket). Client will update DOM after received diff HTML (using </a:t>
             </a:r>
             <a:r>
               <a:rPr lang="en" sz="1250" u="sng">
@@ -9087,14 +9087,14 @@
               <a:buNone/>
             </a:pPr>
             <a:r>
-              <a:rPr lang="en" sz="1700">
+              <a:rPr i="1" lang="en" sz="1700">
                 <a:solidFill>
                   <a:schemeClr val="dk2"/>
                 </a:solidFill>
               </a:rPr>
               <a:t>Heex engine is used for generating HTML from template.</a:t>
             </a:r>
-            <a:endParaRPr sz="1700">
+            <a:endParaRPr i="1" sz="1700">
               <a:solidFill>
                 <a:schemeClr val="dk2"/>
               </a:solidFill>
@@ -9801,6 +9801,49 @@
               <a:buNone/>
             </a:pPr>
             <a:r>
+              <a:rPr i="1" lang="en" sz="1600">
+                <a:solidFill>
+                  <a:schemeClr val="dk2"/>
+                </a:solidFill>
+              </a:rPr>
+              <a:t>Note: State is stored in socket.assigns</a:t>
+            </a:r>
+            <a:endParaRPr i="1" sz="1600">
+              <a:solidFill>
+                <a:schemeClr val="dk2"/>
+              </a:solidFill>
+            </a:endParaRPr>
+          </a:p>
+          <a:p>
+            <a:pPr indent="0" lvl="0" marL="0" rtl="0" algn="l">
+              <a:spcBef>
+                <a:spcPts val="0"/>
+              </a:spcBef>
+              <a:spcAft>
+                <a:spcPts val="0"/>
+              </a:spcAft>
+              <a:buNone/>
+            </a:pPr>
+            <a:r>
+              <a:t/>
+            </a:r>
+            <a:endParaRPr sz="1800">
+              <a:solidFill>
+                <a:schemeClr val="dk2"/>
+              </a:solidFill>
+            </a:endParaRPr>
+          </a:p>
+          <a:p>
+            <a:pPr indent="0" lvl="0" marL="0" rtl="0" algn="l">
+              <a:spcBef>
+                <a:spcPts val="0"/>
+              </a:spcBef>
+              <a:spcAft>
+                <a:spcPts val="0"/>
+              </a:spcAft>
+              <a:buNone/>
+            </a:pPr>
+            <a:r>
               <a:t/>
             </a:r>
             <a:endParaRPr sz="1800">
@@ -10435,7 +10478,7 @@
                   <a:schemeClr val="dk2"/>
                 </a:solidFill>
               </a:rPr>
-              <a:t>For event from client we use handle_event. For internal event in server side we use handle_info or handle_call/handle_cast (call from our implemented APIs to LiveView).</a:t>
+              <a:t>For event from client we use handle_event. For internal event in server side we use handle_info or handle_call/handle_cast (call from our implemented APIs to LiveView process).</a:t>
             </a:r>
             <a:endParaRPr sz="1800">
               <a:solidFill>
@@ -10694,23 +10737,6 @@
             </a:pPr>
             <a:r>
               <a:rPr lang="en"/>
-              <a:t>Benefits for using LiveView</a:t>
-            </a:r>
-            <a:endParaRPr/>
-          </a:p>
-          <a:p>
-            <a:pPr indent="-342900" lvl="0" marL="457200" rtl="0" algn="l">
-              <a:spcBef>
-                <a:spcPts val="0"/>
-              </a:spcBef>
-              <a:spcAft>
-                <a:spcPts val="0"/>
-              </a:spcAft>
-              <a:buSzPts val="1800"/>
-              <a:buAutoNum type="arabicPeriod"/>
-            </a:pPr>
-            <a:r>
-              <a:rPr lang="en"/>
               <a:t>Deep dive into LiveView</a:t>
             </a:r>
             <a:endParaRPr/>
@@ -11083,57 +11109,39 @@
         <p:nvSpPr>
           <p:cNvPr id="202" name="Google Shape;202;p33"/>
           <p:cNvSpPr txBox="1"/>
-          <p:nvPr/>
-        </p:nvSpPr>
-        <p:spPr>
-          <a:xfrm>
-            <a:off x="1086500" y="508975"/>
-            <a:ext cx="6537300" cy="646500"/>
+          <p:nvPr>
+            <p:ph type="title"/>
+          </p:nvPr>
+        </p:nvSpPr>
+        <p:spPr>
+          <a:xfrm>
+            <a:off x="265500" y="1233175"/>
+            <a:ext cx="4045200" cy="1482300"/>
           </a:xfrm>
           <a:prstGeom prst="rect">
             <a:avLst/>
           </a:prstGeom>
-          <a:noFill/>
-          <a:ln>
-            <a:noFill/>
-          </a:ln>
         </p:spPr>
         <p:txBody>
-          <a:bodyPr anchorCtr="0" anchor="t" bIns="91425" lIns="91425" spcFirstLastPara="1" rIns="91425" wrap="square" tIns="91425">
-            <a:spAutoFit/>
+          <a:bodyPr anchorCtr="0" anchor="b" bIns="91425" lIns="91425" spcFirstLastPara="1" rIns="91425" wrap="square" tIns="91425">
+            <a:normAutofit/>
           </a:bodyPr>
           <a:lstStyle/>
           <a:p>
-            <a:pPr indent="0" lvl="0" marL="0" rtl="0" algn="l">
-              <a:spcBef>
-                <a:spcPts val="0"/>
-              </a:spcBef>
-              <a:spcAft>
-                <a:spcPts val="0"/>
-              </a:spcAft>
-              <a:buNone/>
-            </a:pPr>
-            <a:r>
-              <a:rPr lang="en" sz="3000">
-                <a:solidFill>
-                  <a:schemeClr val="dk1"/>
-                </a:solidFill>
-                <a:latin typeface="Roboto"/>
-                <a:ea typeface="Roboto"/>
-                <a:cs typeface="Roboto"/>
-                <a:sym typeface="Roboto"/>
-              </a:rPr>
-              <a:t>LiveView - Optimization Guide</a:t>
-            </a:r>
-            <a:endParaRPr sz="3000">
-              <a:solidFill>
-                <a:schemeClr val="dk1"/>
-              </a:solidFill>
-              <a:latin typeface="Roboto"/>
-              <a:ea typeface="Roboto"/>
-              <a:cs typeface="Roboto"/>
-              <a:sym typeface="Roboto"/>
-            </a:endParaRPr>
+            <a:pPr indent="0" lvl="0" marL="0" rtl="0" algn="ctr">
+              <a:spcBef>
+                <a:spcPts val="0"/>
+              </a:spcBef>
+              <a:spcAft>
+                <a:spcPts val="0"/>
+              </a:spcAft>
+              <a:buNone/>
+            </a:pPr>
+            <a:r>
+              <a:rPr lang="en"/>
+              <a:t>Demo</a:t>
+            </a:r>
+            <a:endParaRPr/>
           </a:p>
         </p:txBody>
       </p:sp>
@@ -11141,48 +11149,39 @@
         <p:nvSpPr>
           <p:cNvPr id="203" name="Google Shape;203;p33"/>
           <p:cNvSpPr txBox="1"/>
-          <p:nvPr/>
-        </p:nvSpPr>
-        <p:spPr>
-          <a:xfrm>
-            <a:off x="962250" y="1557125"/>
-            <a:ext cx="3111900" cy="461700"/>
+          <p:nvPr>
+            <p:ph idx="1" type="subTitle"/>
+          </p:nvPr>
+        </p:nvSpPr>
+        <p:spPr>
+          <a:xfrm>
+            <a:off x="265500" y="2803075"/>
+            <a:ext cx="4045200" cy="1235100"/>
           </a:xfrm>
           <a:prstGeom prst="rect">
             <a:avLst/>
           </a:prstGeom>
-          <a:noFill/>
-          <a:ln>
-            <a:noFill/>
-          </a:ln>
         </p:spPr>
         <p:txBody>
           <a:bodyPr anchorCtr="0" anchor="t" bIns="91425" lIns="91425" spcFirstLastPara="1" rIns="91425" wrap="square" tIns="91425">
-            <a:spAutoFit/>
+            <a:normAutofit/>
           </a:bodyPr>
           <a:lstStyle/>
           <a:p>
-            <a:pPr indent="0" lvl="0" marL="0" rtl="0" algn="l">
-              <a:spcBef>
-                <a:spcPts val="0"/>
-              </a:spcBef>
-              <a:spcAft>
-                <a:spcPts val="0"/>
-              </a:spcAft>
-              <a:buNone/>
-            </a:pPr>
-            <a:r>
-              <a:t/>
-            </a:r>
-            <a:endParaRPr sz="1800">
-              <a:solidFill>
-                <a:schemeClr val="dk2"/>
-              </a:solidFill>
-              <a:latin typeface="Roboto"/>
-              <a:ea typeface="Roboto"/>
-              <a:cs typeface="Roboto"/>
-              <a:sym typeface="Roboto"/>
-            </a:endParaRPr>
+            <a:pPr indent="0" lvl="0" marL="0" rtl="0" algn="ctr">
+              <a:spcBef>
+                <a:spcPts val="0"/>
+              </a:spcBef>
+              <a:spcAft>
+                <a:spcPts val="0"/>
+              </a:spcAft>
+              <a:buNone/>
+            </a:pPr>
+            <a:r>
+              <a:rPr lang="en"/>
+              <a:t>Small Elixir app show how LiveView work.</a:t>
+            </a:r>
+            <a:endParaRPr/>
           </a:p>
         </p:txBody>
       </p:sp>
@@ -11190,24 +11189,22 @@
         <p:nvSpPr>
           <p:cNvPr id="204" name="Google Shape;204;p33"/>
           <p:cNvSpPr txBox="1"/>
-          <p:nvPr/>
-        </p:nvSpPr>
-        <p:spPr>
-          <a:xfrm>
-            <a:off x="719125" y="1368025"/>
-            <a:ext cx="7482900" cy="3274200"/>
+          <p:nvPr>
+            <p:ph idx="2" type="body"/>
+          </p:nvPr>
+        </p:nvSpPr>
+        <p:spPr>
+          <a:xfrm>
+            <a:off x="4939500" y="724075"/>
+            <a:ext cx="3837000" cy="3695100"/>
           </a:xfrm>
           <a:prstGeom prst="rect">
             <a:avLst/>
           </a:prstGeom>
-          <a:noFill/>
-          <a:ln>
-            <a:noFill/>
-          </a:ln>
         </p:spPr>
         <p:txBody>
-          <a:bodyPr anchorCtr="0" anchor="t" bIns="91425" lIns="91425" spcFirstLastPara="1" rIns="91425" wrap="square" tIns="91425">
-            <a:noAutofit/>
+          <a:bodyPr anchorCtr="0" anchor="ctr" bIns="91425" lIns="91425" spcFirstLastPara="1" rIns="91425" wrap="square" tIns="91425">
+            <a:normAutofit/>
           </a:bodyPr>
           <a:lstStyle/>
           <a:p>
@@ -11221,233 +11218,26 @@
               <a:buNone/>
             </a:pPr>
             <a:r>
-              <a:rPr lang="en" sz="1800">
-                <a:solidFill>
-                  <a:schemeClr val="dk2"/>
-                </a:solidFill>
-              </a:rPr>
-              <a:t>Async for fast response to client, data will be pushed later</a:t>
-            </a:r>
-            <a:r>
-              <a:rPr lang="en" sz="1800">
-                <a:solidFill>
-                  <a:schemeClr val="dk2"/>
-                </a:solidFill>
-              </a:rPr>
-              <a:t>.</a:t>
-            </a:r>
-            <a:endParaRPr sz="1800">
-              <a:solidFill>
-                <a:schemeClr val="dk2"/>
-              </a:solidFill>
-            </a:endParaRPr>
+              <a:rPr lang="en"/>
+              <a:t>How LiveView run fast &amp; easy to add real-time to web app.</a:t>
+            </a:r>
+            <a:endParaRPr/>
           </a:p>
           <a:p>
             <a:pPr indent="0" lvl="0" marL="0" rtl="0" algn="l">
               <a:spcBef>
-                <a:spcPts val="0"/>
-              </a:spcBef>
-              <a:spcAft>
-                <a:spcPts val="0"/>
-              </a:spcAft>
-              <a:buNone/>
-            </a:pPr>
-            <a:r>
-              <a:t/>
-            </a:r>
-            <a:endParaRPr sz="1800">
-              <a:solidFill>
-                <a:schemeClr val="dk2"/>
-              </a:solidFill>
-            </a:endParaRPr>
-          </a:p>
-          <a:p>
-            <a:pPr indent="0" lvl="0" marL="0" rtl="0" algn="l">
-              <a:spcBef>
-                <a:spcPts val="0"/>
-              </a:spcBef>
-              <a:spcAft>
-                <a:spcPts val="0"/>
-              </a:spcAft>
-              <a:buNone/>
-            </a:pPr>
-            <a:r>
-              <a:rPr lang="en" sz="1800">
-                <a:solidFill>
-                  <a:schemeClr val="dk2"/>
-                </a:solidFill>
-              </a:rPr>
-              <a:t>Stream for large list need to insert/update/delete later.</a:t>
-            </a:r>
-            <a:endParaRPr sz="1800">
-              <a:solidFill>
-                <a:schemeClr val="dk2"/>
-              </a:solidFill>
-            </a:endParaRPr>
-          </a:p>
-          <a:p>
-            <a:pPr indent="0" lvl="0" marL="0" rtl="0" algn="l">
-              <a:spcBef>
-                <a:spcPts val="0"/>
-              </a:spcBef>
-              <a:spcAft>
-                <a:spcPts val="0"/>
-              </a:spcAft>
-              <a:buNone/>
-            </a:pPr>
-            <a:r>
-              <a:t/>
-            </a:r>
-            <a:endParaRPr sz="1800">
-              <a:solidFill>
-                <a:schemeClr val="dk2"/>
-              </a:solidFill>
-            </a:endParaRPr>
-          </a:p>
-          <a:p>
-            <a:pPr indent="0" lvl="0" marL="0" rtl="0" algn="l">
-              <a:spcBef>
-                <a:spcPts val="0"/>
-              </a:spcBef>
-              <a:spcAft>
-                <a:spcPts val="0"/>
-              </a:spcAft>
-              <a:buNone/>
-            </a:pPr>
-            <a:r>
-              <a:rPr lang="en" sz="1800">
-                <a:solidFill>
-                  <a:schemeClr val="dk2"/>
-                </a:solidFill>
-              </a:rPr>
-              <a:t>Usings Hook for specialized thing (ex: update route in a map from 3rd, infinite scroll list, ...).</a:t>
-            </a:r>
-            <a:endParaRPr sz="1800">
-              <a:solidFill>
-                <a:schemeClr val="dk2"/>
-              </a:solidFill>
-            </a:endParaRPr>
-          </a:p>
-          <a:p>
-            <a:pPr indent="0" lvl="0" marL="0" rtl="0" algn="l">
-              <a:spcBef>
-                <a:spcPts val="0"/>
-              </a:spcBef>
-              <a:spcAft>
-                <a:spcPts val="0"/>
-              </a:spcAft>
-              <a:buNone/>
-            </a:pPr>
-            <a:r>
-              <a:t/>
-            </a:r>
-            <a:endParaRPr sz="1800">
-              <a:solidFill>
-                <a:schemeClr val="dk2"/>
-              </a:solidFill>
-            </a:endParaRPr>
-          </a:p>
-          <a:p>
-            <a:pPr indent="0" lvl="0" marL="0" rtl="0" algn="l">
-              <a:spcBef>
-                <a:spcPts val="0"/>
-              </a:spcBef>
-              <a:spcAft>
-                <a:spcPts val="0"/>
-              </a:spcAft>
-              <a:buNone/>
-            </a:pPr>
-            <a:r>
-              <a:rPr lang="en" sz="1800">
-                <a:solidFill>
-                  <a:schemeClr val="dk2"/>
-                </a:solidFill>
-              </a:rPr>
-              <a:t>Using connected?(socket) function to ignore things that don’t need to show in first phase (get request - get full HTML).</a:t>
-            </a:r>
-            <a:endParaRPr sz="1800">
-              <a:solidFill>
-                <a:schemeClr val="dk2"/>
-              </a:solidFill>
-            </a:endParaRPr>
-          </a:p>
-          <a:p>
-            <a:pPr indent="0" lvl="0" marL="0" rtl="0" algn="l">
-              <a:spcBef>
-                <a:spcPts val="0"/>
-              </a:spcBef>
-              <a:spcAft>
-                <a:spcPts val="0"/>
-              </a:spcAft>
-              <a:buNone/>
-            </a:pPr>
-            <a:r>
-              <a:t/>
-            </a:r>
-            <a:endParaRPr sz="1800">
-              <a:solidFill>
-                <a:schemeClr val="dk2"/>
-              </a:solidFill>
-            </a:endParaRPr>
-          </a:p>
-          <a:p>
-            <a:pPr indent="0" lvl="0" marL="0" rtl="0" algn="l">
-              <a:spcBef>
-                <a:spcPts val="0"/>
-              </a:spcBef>
-              <a:spcAft>
-                <a:spcPts val="0"/>
-              </a:spcAft>
-              <a:buNone/>
-            </a:pPr>
-            <a:r>
-              <a:rPr lang="en" sz="1800">
-                <a:solidFill>
-                  <a:schemeClr val="dk2"/>
-                </a:solidFill>
-              </a:rPr>
-              <a:t>Avoid to render dynamic content that included big list/table, it </a:t>
-            </a:r>
-            <a:r>
-              <a:rPr lang="en" sz="1800">
-                <a:solidFill>
-                  <a:schemeClr val="dk2"/>
-                </a:solidFill>
-              </a:rPr>
-              <a:t>consume</a:t>
-            </a:r>
-            <a:r>
-              <a:rPr lang="en" sz="1800">
-                <a:solidFill>
-                  <a:schemeClr val="dk2"/>
-                </a:solidFill>
-              </a:rPr>
-              <a:t> too much time for LiveView process to calc diff HTML.</a:t>
-            </a:r>
-            <a:endParaRPr sz="1800">
-              <a:solidFill>
-                <a:schemeClr val="dk2"/>
-              </a:solidFill>
-            </a:endParaRPr>
-          </a:p>
-          <a:p>
-            <a:pPr indent="0" lvl="0" marL="0" rtl="0" algn="l">
-              <a:spcBef>
-                <a:spcPts val="0"/>
-              </a:spcBef>
-              <a:spcAft>
-                <a:spcPts val="0"/>
-              </a:spcAft>
-              <a:buNone/>
-            </a:pPr>
-            <a:r>
-              <a:t/>
-            </a:r>
-            <a:endParaRPr sz="1800">
-              <a:solidFill>
-                <a:schemeClr val="dk2"/>
-              </a:solidFill>
-            </a:endParaRPr>
+                <a:spcPts val="1200"/>
+              </a:spcBef>
+              <a:spcAft>
+                <a:spcPts val="1200"/>
+              </a:spcAft>
+              <a:buNone/>
+            </a:pPr>
+            <a:r>
+              <a:rPr lang="en"/>
+              <a:t>How LiveView calculate diff HTML to reduce data send to client.</a:t>
+            </a:r>
+            <a:endParaRPr/>
           </a:p>
         </p:txBody>
       </p:sp>
@@ -11480,39 +11270,57 @@
         <p:nvSpPr>
           <p:cNvPr id="209" name="Google Shape;209;p34"/>
           <p:cNvSpPr txBox="1"/>
-          <p:nvPr>
-            <p:ph type="title"/>
-          </p:nvPr>
-        </p:nvSpPr>
-        <p:spPr>
-          <a:xfrm>
-            <a:off x="265500" y="1233175"/>
-            <a:ext cx="4045200" cy="1482300"/>
+          <p:nvPr/>
+        </p:nvSpPr>
+        <p:spPr>
+          <a:xfrm>
+            <a:off x="1086500" y="508975"/>
+            <a:ext cx="6537300" cy="646500"/>
           </a:xfrm>
           <a:prstGeom prst="rect">
             <a:avLst/>
           </a:prstGeom>
+          <a:noFill/>
+          <a:ln>
+            <a:noFill/>
+          </a:ln>
         </p:spPr>
         <p:txBody>
-          <a:bodyPr anchorCtr="0" anchor="b" bIns="91425" lIns="91425" spcFirstLastPara="1" rIns="91425" wrap="square" tIns="91425">
-            <a:normAutofit/>
+          <a:bodyPr anchorCtr="0" anchor="t" bIns="91425" lIns="91425" spcFirstLastPara="1" rIns="91425" wrap="square" tIns="91425">
+            <a:spAutoFit/>
           </a:bodyPr>
           <a:lstStyle/>
           <a:p>
-            <a:pPr indent="0" lvl="0" marL="0" rtl="0" algn="ctr">
-              <a:spcBef>
-                <a:spcPts val="0"/>
-              </a:spcBef>
-              <a:spcAft>
-                <a:spcPts val="0"/>
-              </a:spcAft>
-              <a:buNone/>
-            </a:pPr>
-            <a:r>
-              <a:rPr lang="en"/>
-              <a:t>Demo</a:t>
-            </a:r>
-            <a:endParaRPr/>
+            <a:pPr indent="0" lvl="0" marL="0" rtl="0" algn="l">
+              <a:spcBef>
+                <a:spcPts val="0"/>
+              </a:spcBef>
+              <a:spcAft>
+                <a:spcPts val="0"/>
+              </a:spcAft>
+              <a:buNone/>
+            </a:pPr>
+            <a:r>
+              <a:rPr lang="en" sz="3000">
+                <a:solidFill>
+                  <a:schemeClr val="dk1"/>
+                </a:solidFill>
+                <a:latin typeface="Roboto"/>
+                <a:ea typeface="Roboto"/>
+                <a:cs typeface="Roboto"/>
+                <a:sym typeface="Roboto"/>
+              </a:rPr>
+              <a:t>LiveView - Optimization Guide</a:t>
+            </a:r>
+            <a:endParaRPr sz="3000">
+              <a:solidFill>
+                <a:schemeClr val="dk1"/>
+              </a:solidFill>
+              <a:latin typeface="Roboto"/>
+              <a:ea typeface="Roboto"/>
+              <a:cs typeface="Roboto"/>
+              <a:sym typeface="Roboto"/>
+            </a:endParaRPr>
           </a:p>
         </p:txBody>
       </p:sp>
@@ -11520,39 +11328,48 @@
         <p:nvSpPr>
           <p:cNvPr id="210" name="Google Shape;210;p34"/>
           <p:cNvSpPr txBox="1"/>
-          <p:nvPr>
-            <p:ph idx="1" type="subTitle"/>
-          </p:nvPr>
-        </p:nvSpPr>
-        <p:spPr>
-          <a:xfrm>
-            <a:off x="265500" y="2803075"/>
-            <a:ext cx="4045200" cy="1235100"/>
+          <p:nvPr/>
+        </p:nvSpPr>
+        <p:spPr>
+          <a:xfrm>
+            <a:off x="962250" y="1557125"/>
+            <a:ext cx="3111900" cy="461700"/>
           </a:xfrm>
           <a:prstGeom prst="rect">
             <a:avLst/>
           </a:prstGeom>
+          <a:noFill/>
+          <a:ln>
+            <a:noFill/>
+          </a:ln>
         </p:spPr>
         <p:txBody>
           <a:bodyPr anchorCtr="0" anchor="t" bIns="91425" lIns="91425" spcFirstLastPara="1" rIns="91425" wrap="square" tIns="91425">
-            <a:normAutofit/>
+            <a:spAutoFit/>
           </a:bodyPr>
           <a:lstStyle/>
           <a:p>
-            <a:pPr indent="0" lvl="0" marL="0" rtl="0" algn="ctr">
-              <a:spcBef>
-                <a:spcPts val="0"/>
-              </a:spcBef>
-              <a:spcAft>
-                <a:spcPts val="0"/>
-              </a:spcAft>
-              <a:buNone/>
-            </a:pPr>
-            <a:r>
-              <a:rPr lang="en"/>
-              <a:t>Small Elixir app show how LiveView work.</a:t>
-            </a:r>
-            <a:endParaRPr/>
+            <a:pPr indent="0" lvl="0" marL="0" rtl="0" algn="l">
+              <a:spcBef>
+                <a:spcPts val="0"/>
+              </a:spcBef>
+              <a:spcAft>
+                <a:spcPts val="0"/>
+              </a:spcAft>
+              <a:buNone/>
+            </a:pPr>
+            <a:r>
+              <a:t/>
+            </a:r>
+            <a:endParaRPr sz="1800">
+              <a:solidFill>
+                <a:schemeClr val="dk2"/>
+              </a:solidFill>
+              <a:latin typeface="Roboto"/>
+              <a:ea typeface="Roboto"/>
+              <a:cs typeface="Roboto"/>
+              <a:sym typeface="Roboto"/>
+            </a:endParaRPr>
           </a:p>
         </p:txBody>
       </p:sp>
@@ -11560,22 +11377,24 @@
         <p:nvSpPr>
           <p:cNvPr id="211" name="Google Shape;211;p34"/>
           <p:cNvSpPr txBox="1"/>
-          <p:nvPr>
-            <p:ph idx="2" type="body"/>
-          </p:nvPr>
-        </p:nvSpPr>
-        <p:spPr>
-          <a:xfrm>
-            <a:off x="4939500" y="724075"/>
-            <a:ext cx="3837000" cy="3695100"/>
+          <p:nvPr/>
+        </p:nvSpPr>
+        <p:spPr>
+          <a:xfrm>
+            <a:off x="719125" y="1368025"/>
+            <a:ext cx="7482900" cy="3274200"/>
           </a:xfrm>
           <a:prstGeom prst="rect">
             <a:avLst/>
           </a:prstGeom>
+          <a:noFill/>
+          <a:ln>
+            <a:noFill/>
+          </a:ln>
         </p:spPr>
         <p:txBody>
-          <a:bodyPr anchorCtr="0" anchor="ctr" bIns="91425" lIns="91425" spcFirstLastPara="1" rIns="91425" wrap="square" tIns="91425">
-            <a:normAutofit/>
+          <a:bodyPr anchorCtr="0" anchor="t" bIns="91425" lIns="91425" spcFirstLastPara="1" rIns="91425" wrap="square" tIns="91425">
+            <a:noAutofit/>
           </a:bodyPr>
           <a:lstStyle/>
           <a:p>
@@ -11589,26 +11408,233 @@
               <a:buNone/>
             </a:pPr>
             <a:r>
-              <a:rPr lang="en"/>
-              <a:t>How LiveView run fast &amp; easy to add real-time to web app.</a:t>
-            </a:r>
-            <a:endParaRPr/>
+              <a:rPr lang="en" sz="1800">
+                <a:solidFill>
+                  <a:schemeClr val="dk2"/>
+                </a:solidFill>
+              </a:rPr>
+              <a:t>Async for fast response to client, data will be pushed later</a:t>
+            </a:r>
+            <a:r>
+              <a:rPr lang="en" sz="1800">
+                <a:solidFill>
+                  <a:schemeClr val="dk2"/>
+                </a:solidFill>
+              </a:rPr>
+              <a:t>.</a:t>
+            </a:r>
+            <a:endParaRPr sz="1800">
+              <a:solidFill>
+                <a:schemeClr val="dk2"/>
+              </a:solidFill>
+            </a:endParaRPr>
           </a:p>
           <a:p>
             <a:pPr indent="0" lvl="0" marL="0" rtl="0" algn="l">
               <a:spcBef>
-                <a:spcPts val="1200"/>
-              </a:spcBef>
-              <a:spcAft>
-                <a:spcPts val="1200"/>
-              </a:spcAft>
-              <a:buNone/>
-            </a:pPr>
-            <a:r>
-              <a:rPr lang="en"/>
-              <a:t>How LiveView calculate diff HTML to reduce data send to client.</a:t>
-            </a:r>
-            <a:endParaRPr/>
+                <a:spcPts val="0"/>
+              </a:spcBef>
+              <a:spcAft>
+                <a:spcPts val="0"/>
+              </a:spcAft>
+              <a:buNone/>
+            </a:pPr>
+            <a:r>
+              <a:t/>
+            </a:r>
+            <a:endParaRPr sz="1800">
+              <a:solidFill>
+                <a:schemeClr val="dk2"/>
+              </a:solidFill>
+            </a:endParaRPr>
+          </a:p>
+          <a:p>
+            <a:pPr indent="0" lvl="0" marL="0" rtl="0" algn="l">
+              <a:spcBef>
+                <a:spcPts val="0"/>
+              </a:spcBef>
+              <a:spcAft>
+                <a:spcPts val="0"/>
+              </a:spcAft>
+              <a:buNone/>
+            </a:pPr>
+            <a:r>
+              <a:rPr lang="en" sz="1800">
+                <a:solidFill>
+                  <a:schemeClr val="dk2"/>
+                </a:solidFill>
+              </a:rPr>
+              <a:t>Stream for large list need to insert/update/delete later.</a:t>
+            </a:r>
+            <a:endParaRPr sz="1800">
+              <a:solidFill>
+                <a:schemeClr val="dk2"/>
+              </a:solidFill>
+            </a:endParaRPr>
+          </a:p>
+          <a:p>
+            <a:pPr indent="0" lvl="0" marL="0" rtl="0" algn="l">
+              <a:spcBef>
+                <a:spcPts val="0"/>
+              </a:spcBef>
+              <a:spcAft>
+                <a:spcPts val="0"/>
+              </a:spcAft>
+              <a:buNone/>
+            </a:pPr>
+            <a:r>
+              <a:t/>
+            </a:r>
+            <a:endParaRPr sz="1800">
+              <a:solidFill>
+                <a:schemeClr val="dk2"/>
+              </a:solidFill>
+            </a:endParaRPr>
+          </a:p>
+          <a:p>
+            <a:pPr indent="0" lvl="0" marL="0" rtl="0" algn="l">
+              <a:spcBef>
+                <a:spcPts val="0"/>
+              </a:spcBef>
+              <a:spcAft>
+                <a:spcPts val="0"/>
+              </a:spcAft>
+              <a:buNone/>
+            </a:pPr>
+            <a:r>
+              <a:rPr lang="en" sz="1800">
+                <a:solidFill>
+                  <a:schemeClr val="dk2"/>
+                </a:solidFill>
+              </a:rPr>
+              <a:t>Usings Hook for specialized thing (ex: update route in a map from 3rd, infinite scroll list - can work with stream, ...).</a:t>
+            </a:r>
+            <a:endParaRPr sz="1800">
+              <a:solidFill>
+                <a:schemeClr val="dk2"/>
+              </a:solidFill>
+            </a:endParaRPr>
+          </a:p>
+          <a:p>
+            <a:pPr indent="0" lvl="0" marL="0" rtl="0" algn="l">
+              <a:spcBef>
+                <a:spcPts val="0"/>
+              </a:spcBef>
+              <a:spcAft>
+                <a:spcPts val="0"/>
+              </a:spcAft>
+              <a:buNone/>
+            </a:pPr>
+            <a:r>
+              <a:t/>
+            </a:r>
+            <a:endParaRPr sz="1800">
+              <a:solidFill>
+                <a:schemeClr val="dk2"/>
+              </a:solidFill>
+            </a:endParaRPr>
+          </a:p>
+          <a:p>
+            <a:pPr indent="0" lvl="0" marL="0" rtl="0" algn="l">
+              <a:spcBef>
+                <a:spcPts val="0"/>
+              </a:spcBef>
+              <a:spcAft>
+                <a:spcPts val="0"/>
+              </a:spcAft>
+              <a:buNone/>
+            </a:pPr>
+            <a:r>
+              <a:rPr lang="en" sz="1800">
+                <a:solidFill>
+                  <a:schemeClr val="dk2"/>
+                </a:solidFill>
+              </a:rPr>
+              <a:t>Using connected?(socket) function to ignore things that don’t need to show in first phase (get request - get full HTML).</a:t>
+            </a:r>
+            <a:endParaRPr sz="1800">
+              <a:solidFill>
+                <a:schemeClr val="dk2"/>
+              </a:solidFill>
+            </a:endParaRPr>
+          </a:p>
+          <a:p>
+            <a:pPr indent="0" lvl="0" marL="0" rtl="0" algn="l">
+              <a:spcBef>
+                <a:spcPts val="0"/>
+              </a:spcBef>
+              <a:spcAft>
+                <a:spcPts val="0"/>
+              </a:spcAft>
+              <a:buNone/>
+            </a:pPr>
+            <a:r>
+              <a:t/>
+            </a:r>
+            <a:endParaRPr sz="1800">
+              <a:solidFill>
+                <a:schemeClr val="dk2"/>
+              </a:solidFill>
+            </a:endParaRPr>
+          </a:p>
+          <a:p>
+            <a:pPr indent="0" lvl="0" marL="0" rtl="0" algn="l">
+              <a:spcBef>
+                <a:spcPts val="0"/>
+              </a:spcBef>
+              <a:spcAft>
+                <a:spcPts val="0"/>
+              </a:spcAft>
+              <a:buNone/>
+            </a:pPr>
+            <a:r>
+              <a:rPr lang="en" sz="1800">
+                <a:solidFill>
+                  <a:schemeClr val="dk2"/>
+                </a:solidFill>
+              </a:rPr>
+              <a:t>Avoid to render dynamic content that included big list/table, it </a:t>
+            </a:r>
+            <a:r>
+              <a:rPr lang="en" sz="1800">
+                <a:solidFill>
+                  <a:schemeClr val="dk2"/>
+                </a:solidFill>
+              </a:rPr>
+              <a:t>consume</a:t>
+            </a:r>
+            <a:r>
+              <a:rPr lang="en" sz="1800">
+                <a:solidFill>
+                  <a:schemeClr val="dk2"/>
+                </a:solidFill>
+              </a:rPr>
+              <a:t> too much time for LiveView process to calc diff HTML.</a:t>
+            </a:r>
+            <a:endParaRPr sz="1800">
+              <a:solidFill>
+                <a:schemeClr val="dk2"/>
+              </a:solidFill>
+            </a:endParaRPr>
+          </a:p>
+          <a:p>
+            <a:pPr indent="0" lvl="0" marL="0" rtl="0" algn="l">
+              <a:spcBef>
+                <a:spcPts val="0"/>
+              </a:spcBef>
+              <a:spcAft>
+                <a:spcPts val="0"/>
+              </a:spcAft>
+              <a:buNone/>
+            </a:pPr>
+            <a:r>
+              <a:t/>
+            </a:r>
+            <a:endParaRPr sz="1800">
+              <a:solidFill>
+                <a:schemeClr val="dk2"/>
+              </a:solidFill>
+            </a:endParaRPr>
           </a:p>
         </p:txBody>
       </p:sp>
@@ -15257,7 +15283,7 @@
             </a:r>
             <a:r>
               <a:rPr lang="en" sz="1600"/>
-              <a:t> for made a prototype.</a:t>
+              <a:t> to made a prototype.</a:t>
             </a:r>
             <a:endParaRPr sz="1600"/>
           </a:p>
@@ -15478,7 +15504,7 @@
             </a:pPr>
             <a:r>
               <a:rPr lang="en" sz="1600"/>
-              <a:t>Save cost &amp; time for startup expand.</a:t>
+              <a:t>Save cost &amp; time for expanding.</a:t>
             </a:r>
             <a:endParaRPr sz="1600"/>
           </a:p>
@@ -15726,7 +15752,7 @@
             </a:pPr>
             <a:r>
               <a:rPr lang="en" sz="1600"/>
-              <a:t>LiveView is very attractive us in case  realtime &amp; scalable of it.</a:t>
+              <a:t>LiveView is very attractive for us in case  realtime, scalable &amp; easy to use.</a:t>
             </a:r>
             <a:endParaRPr sz="1600"/>
           </a:p>
@@ -16226,7 +16252,15 @@
             </a:pPr>
             <a:r>
               <a:rPr lang="en"/>
-              <a:t>Easy to synchronize data in multi views.</a:t>
+              <a:t>Easy to synchronize data in multi views/</a:t>
+            </a:r>
+            <a:r>
+              <a:rPr lang="en"/>
+              <a:t>multi nodes</a:t>
+            </a:r>
+            <a:r>
+              <a:rPr lang="en"/>
+              <a:t>.</a:t>
             </a:r>
             <a:endParaRPr/>
           </a:p>
@@ -16483,7 +16517,7 @@
             </a:pPr>
             <a:r>
               <a:rPr lang="en"/>
-              <a:t>Take to much effort to build a real-time web app.</a:t>
+              <a:t>Take too much effort to build a real-time web app.</a:t>
             </a:r>
             <a:endParaRPr/>
           </a:p>

</xml_diff>